<commit_message>
Adjusted to Work with Printer
The labels are now further from the edges and the appropriate size for a
standard sheet of paper. Note that the "original size" option should
still be selected, as the printer may try to shrink the labels.
</commit_message>
<xml_diff>
--- a/ChaprSVN/Case/Labels/Editable Label v2.0.pptx
+++ b/ChaprSVN/Case/Labels/Editable Label v2.0.pptx
@@ -104,6 +104,11 @@
       </a:defRPr>
     </a:lvl9pPr>
   </p:defaultTextStyle>
+  <p:extLst>
+    <p:ext uri="{EFAFB233-063F-42B5-8137-9DF3F51BA10A}">
+      <p15:sldGuideLst xmlns:p15="http://schemas.microsoft.com/office/powerpoint/2012/main"/>
+    </p:ext>
+  </p:extLst>
 </p:presentation>
 </file>
 
@@ -152,7 +157,6 @@
               <a:rPr lang="en-US"/>
               <a:t>Click to edit Master title style</a:t>
             </a:r>
-            <a:endParaRPr lang="en-US"/>
           </a:p>
         </p:txBody>
       </p:sp>
@@ -217,7 +221,6 @@
               <a:rPr lang="en-US"/>
               <a:t>Click to edit Master subtitle style</a:t>
             </a:r>
-            <a:endParaRPr lang="en-US"/>
           </a:p>
         </p:txBody>
       </p:sp>
@@ -335,7 +338,6 @@
               <a:rPr lang="en-US"/>
               <a:t>Click to edit Master title style</a:t>
             </a:r>
-            <a:endParaRPr lang="en-US"/>
           </a:p>
         </p:txBody>
       </p:sp>
@@ -387,7 +389,6 @@
               <a:rPr lang="en-US"/>
               <a:t>Fifth level</a:t>
             </a:r>
-            <a:endParaRPr lang="en-US"/>
           </a:p>
         </p:txBody>
       </p:sp>
@@ -510,7 +511,6 @@
               <a:rPr lang="en-US"/>
               <a:t>Click to edit Master title style</a:t>
             </a:r>
-            <a:endParaRPr lang="en-US"/>
           </a:p>
         </p:txBody>
       </p:sp>
@@ -567,7 +567,6 @@
               <a:rPr lang="en-US"/>
               <a:t>Fifth level</a:t>
             </a:r>
-            <a:endParaRPr lang="en-US"/>
           </a:p>
         </p:txBody>
       </p:sp>
@@ -685,7 +684,6 @@
               <a:rPr lang="en-US"/>
               <a:t>Click to edit Master title style</a:t>
             </a:r>
-            <a:endParaRPr lang="en-US"/>
           </a:p>
         </p:txBody>
       </p:sp>
@@ -737,7 +735,6 @@
               <a:rPr lang="en-US"/>
               <a:t>Fifth level</a:t>
             </a:r>
-            <a:endParaRPr lang="en-US"/>
           </a:p>
         </p:txBody>
       </p:sp>
@@ -864,7 +861,6 @@
               <a:rPr lang="en-US"/>
               <a:t>Click to edit Master title style</a:t>
             </a:r>
-            <a:endParaRPr lang="en-US"/>
           </a:p>
         </p:txBody>
       </p:sp>
@@ -1101,7 +1097,6 @@
               <a:rPr lang="en-US"/>
               <a:t>Click to edit Master title style</a:t>
             </a:r>
-            <a:endParaRPr lang="en-US"/>
           </a:p>
         </p:txBody>
       </p:sp>
@@ -1158,7 +1153,6 @@
               <a:rPr lang="en-US"/>
               <a:t>Fifth level</a:t>
             </a:r>
-            <a:endParaRPr lang="en-US"/>
           </a:p>
         </p:txBody>
       </p:sp>
@@ -1215,7 +1209,6 @@
               <a:rPr lang="en-US"/>
               <a:t>Fifth level</a:t>
             </a:r>
-            <a:endParaRPr lang="en-US"/>
           </a:p>
         </p:txBody>
       </p:sp>
@@ -1338,7 +1331,6 @@
               <a:rPr lang="en-US"/>
               <a:t>Click to edit Master title style</a:t>
             </a:r>
-            <a:endParaRPr lang="en-US"/>
           </a:p>
         </p:txBody>
       </p:sp>
@@ -1460,7 +1452,6 @@
               <a:rPr lang="en-US"/>
               <a:t>Fifth level</a:t>
             </a:r>
-            <a:endParaRPr lang="en-US"/>
           </a:p>
         </p:txBody>
       </p:sp>
@@ -1582,7 +1573,6 @@
               <a:rPr lang="en-US"/>
               <a:t>Fifth level</a:t>
             </a:r>
-            <a:endParaRPr lang="en-US"/>
           </a:p>
         </p:txBody>
       </p:sp>
@@ -1700,7 +1690,6 @@
               <a:rPr lang="en-US"/>
               <a:t>Click to edit Master title style</a:t>
             </a:r>
-            <a:endParaRPr lang="en-US"/>
           </a:p>
         </p:txBody>
       </p:sp>
@@ -1922,7 +1911,6 @@
               <a:rPr lang="en-US"/>
               <a:t>Click to edit Master title style</a:t>
             </a:r>
-            <a:endParaRPr lang="en-US"/>
           </a:p>
         </p:txBody>
       </p:sp>
@@ -2007,7 +1995,6 @@
               <a:rPr lang="en-US"/>
               <a:t>Fifth level</a:t>
             </a:r>
-            <a:endParaRPr lang="en-US"/>
           </a:p>
         </p:txBody>
       </p:sp>
@@ -2199,7 +2186,6 @@
               <a:rPr lang="en-US"/>
               <a:t>Click to edit Master title style</a:t>
             </a:r>
-            <a:endParaRPr lang="en-US"/>
           </a:p>
         </p:txBody>
       </p:sp>
@@ -2458,7 +2444,6 @@
               <a:rPr lang="en-US"/>
               <a:t>Click to edit Master title style</a:t>
             </a:r>
-            <a:endParaRPr lang="en-US"/>
           </a:p>
         </p:txBody>
       </p:sp>
@@ -2520,7 +2505,6 @@
               <a:rPr lang="en-US"/>
               <a:t>Fifth level</a:t>
             </a:r>
-            <a:endParaRPr lang="en-US"/>
           </a:p>
         </p:txBody>
       </p:sp>

</xml_diff>